<commit_message>
[experiment] figure of amory
</commit_message>
<xml_diff>
--- a/WOOT/Figs/armory/armory.pptx
+++ b/WOOT/Figs/armory/armory.pptx
@@ -270,7 +270,7 @@
           <a:p>
             <a:fld id="{9EDF55FF-B3C4-4BA9-9AAE-B6133D8FD231}" type="datetimeFigureOut">
               <a:rPr lang="zh-CN" altLang="en-US" smtClean="0"/>
-              <a:t>2021/1/24</a:t>
+              <a:t>2021/1/30</a:t>
             </a:fld>
             <a:endParaRPr lang="zh-CN" altLang="en-US"/>
           </a:p>
@@ -468,7 +468,7 @@
           <a:p>
             <a:fld id="{9EDF55FF-B3C4-4BA9-9AAE-B6133D8FD231}" type="datetimeFigureOut">
               <a:rPr lang="zh-CN" altLang="en-US" smtClean="0"/>
-              <a:t>2021/1/24</a:t>
+              <a:t>2021/1/30</a:t>
             </a:fld>
             <a:endParaRPr lang="zh-CN" altLang="en-US"/>
           </a:p>
@@ -676,7 +676,7 @@
           <a:p>
             <a:fld id="{9EDF55FF-B3C4-4BA9-9AAE-B6133D8FD231}" type="datetimeFigureOut">
               <a:rPr lang="zh-CN" altLang="en-US" smtClean="0"/>
-              <a:t>2021/1/24</a:t>
+              <a:t>2021/1/30</a:t>
             </a:fld>
             <a:endParaRPr lang="zh-CN" altLang="en-US"/>
           </a:p>
@@ -874,7 +874,7 @@
           <a:p>
             <a:fld id="{9EDF55FF-B3C4-4BA9-9AAE-B6133D8FD231}" type="datetimeFigureOut">
               <a:rPr lang="zh-CN" altLang="en-US" smtClean="0"/>
-              <a:t>2021/1/24</a:t>
+              <a:t>2021/1/30</a:t>
             </a:fld>
             <a:endParaRPr lang="zh-CN" altLang="en-US"/>
           </a:p>
@@ -1149,7 +1149,7 @@
           <a:p>
             <a:fld id="{9EDF55FF-B3C4-4BA9-9AAE-B6133D8FD231}" type="datetimeFigureOut">
               <a:rPr lang="zh-CN" altLang="en-US" smtClean="0"/>
-              <a:t>2021/1/24</a:t>
+              <a:t>2021/1/30</a:t>
             </a:fld>
             <a:endParaRPr lang="zh-CN" altLang="en-US"/>
           </a:p>
@@ -1414,7 +1414,7 @@
           <a:p>
             <a:fld id="{9EDF55FF-B3C4-4BA9-9AAE-B6133D8FD231}" type="datetimeFigureOut">
               <a:rPr lang="zh-CN" altLang="en-US" smtClean="0"/>
-              <a:t>2021/1/24</a:t>
+              <a:t>2021/1/30</a:t>
             </a:fld>
             <a:endParaRPr lang="zh-CN" altLang="en-US"/>
           </a:p>
@@ -1826,7 +1826,7 @@
           <a:p>
             <a:fld id="{9EDF55FF-B3C4-4BA9-9AAE-B6133D8FD231}" type="datetimeFigureOut">
               <a:rPr lang="zh-CN" altLang="en-US" smtClean="0"/>
-              <a:t>2021/1/24</a:t>
+              <a:t>2021/1/30</a:t>
             </a:fld>
             <a:endParaRPr lang="zh-CN" altLang="en-US"/>
           </a:p>
@@ -1967,7 +1967,7 @@
           <a:p>
             <a:fld id="{9EDF55FF-B3C4-4BA9-9AAE-B6133D8FD231}" type="datetimeFigureOut">
               <a:rPr lang="zh-CN" altLang="en-US" smtClean="0"/>
-              <a:t>2021/1/24</a:t>
+              <a:t>2021/1/30</a:t>
             </a:fld>
             <a:endParaRPr lang="zh-CN" altLang="en-US"/>
           </a:p>
@@ -2080,7 +2080,7 @@
           <a:p>
             <a:fld id="{9EDF55FF-B3C4-4BA9-9AAE-B6133D8FD231}" type="datetimeFigureOut">
               <a:rPr lang="zh-CN" altLang="en-US" smtClean="0"/>
-              <a:t>2021/1/24</a:t>
+              <a:t>2021/1/30</a:t>
             </a:fld>
             <a:endParaRPr lang="zh-CN" altLang="en-US"/>
           </a:p>
@@ -2391,7 +2391,7 @@
           <a:p>
             <a:fld id="{9EDF55FF-B3C4-4BA9-9AAE-B6133D8FD231}" type="datetimeFigureOut">
               <a:rPr lang="zh-CN" altLang="en-US" smtClean="0"/>
-              <a:t>2021/1/24</a:t>
+              <a:t>2021/1/30</a:t>
             </a:fld>
             <a:endParaRPr lang="zh-CN" altLang="en-US"/>
           </a:p>
@@ -2679,7 +2679,7 @@
           <a:p>
             <a:fld id="{9EDF55FF-B3C4-4BA9-9AAE-B6133D8FD231}" type="datetimeFigureOut">
               <a:rPr lang="zh-CN" altLang="en-US" smtClean="0"/>
-              <a:t>2021/1/24</a:t>
+              <a:t>2021/1/30</a:t>
             </a:fld>
             <a:endParaRPr lang="zh-CN" altLang="en-US"/>
           </a:p>
@@ -2920,7 +2920,7 @@
           <a:p>
             <a:fld id="{9EDF55FF-B3C4-4BA9-9AAE-B6133D8FD231}" type="datetimeFigureOut">
               <a:rPr lang="zh-CN" altLang="en-US" smtClean="0"/>
-              <a:t>2021/1/24</a:t>
+              <a:t>2021/1/30</a:t>
             </a:fld>
             <a:endParaRPr lang="zh-CN" altLang="en-US"/>
           </a:p>
@@ -3491,15 +3491,15 @@
         </p:spPr>
         <p:style>
           <a:lnRef idx="2">
-            <a:schemeClr val="accent2">
+            <a:schemeClr val="accent5">
               <a:shade val="50000"/>
             </a:schemeClr>
           </a:lnRef>
           <a:fillRef idx="1">
-            <a:schemeClr val="accent2"/>
+            <a:schemeClr val="accent5"/>
           </a:fillRef>
           <a:effectRef idx="0">
-            <a:schemeClr val="accent2"/>
+            <a:schemeClr val="accent5"/>
           </a:effectRef>
           <a:fontRef idx="minor">
             <a:schemeClr val="lt1"/>
@@ -3541,15 +3541,15 @@
         </p:spPr>
         <p:style>
           <a:lnRef idx="2">
-            <a:schemeClr val="accent2">
+            <a:schemeClr val="accent5">
               <a:shade val="50000"/>
             </a:schemeClr>
           </a:lnRef>
           <a:fillRef idx="1">
-            <a:schemeClr val="accent2"/>
+            <a:schemeClr val="accent5"/>
           </a:fillRef>
           <a:effectRef idx="0">
-            <a:schemeClr val="accent2"/>
+            <a:schemeClr val="accent5"/>
           </a:effectRef>
           <a:fontRef idx="minor">
             <a:schemeClr val="lt1"/>
@@ -3591,15 +3591,15 @@
         </p:spPr>
         <p:style>
           <a:lnRef idx="2">
-            <a:schemeClr val="accent2">
+            <a:schemeClr val="accent5">
               <a:shade val="50000"/>
             </a:schemeClr>
           </a:lnRef>
           <a:fillRef idx="1">
-            <a:schemeClr val="accent2"/>
+            <a:schemeClr val="accent5"/>
           </a:fillRef>
           <a:effectRef idx="0">
-            <a:schemeClr val="accent2"/>
+            <a:schemeClr val="accent5"/>
           </a:effectRef>
           <a:fontRef idx="minor">
             <a:schemeClr val="lt1"/>
@@ -3641,15 +3641,15 @@
         </p:spPr>
         <p:style>
           <a:lnRef idx="2">
-            <a:schemeClr val="accent2">
+            <a:schemeClr val="accent5">
               <a:shade val="50000"/>
             </a:schemeClr>
           </a:lnRef>
           <a:fillRef idx="1">
-            <a:schemeClr val="accent2"/>
+            <a:schemeClr val="accent5"/>
           </a:fillRef>
           <a:effectRef idx="0">
-            <a:schemeClr val="accent2"/>
+            <a:schemeClr val="accent5"/>
           </a:effectRef>
           <a:fontRef idx="minor">
             <a:schemeClr val="lt1"/>
@@ -3691,15 +3691,15 @@
         </p:spPr>
         <p:style>
           <a:lnRef idx="2">
-            <a:schemeClr val="accent2">
+            <a:schemeClr val="accent5">
               <a:shade val="50000"/>
             </a:schemeClr>
           </a:lnRef>
           <a:fillRef idx="1">
-            <a:schemeClr val="accent2"/>
+            <a:schemeClr val="accent5"/>
           </a:fillRef>
           <a:effectRef idx="0">
-            <a:schemeClr val="accent2"/>
+            <a:schemeClr val="accent5"/>
           </a:effectRef>
           <a:fontRef idx="minor">
             <a:schemeClr val="lt1"/>
@@ -3737,6 +3737,12 @@
             <a:chOff x="4810693" y="459278"/>
             <a:chExt cx="2704386" cy="755651"/>
           </a:xfrm>
+          <a:solidFill>
+            <a:schemeClr val="accent5">
+              <a:lumMod val="40000"/>
+              <a:lumOff val="60000"/>
+            </a:schemeClr>
+          </a:solidFill>
         </p:grpSpPr>
         <p:sp>
           <p:nvSpPr>
@@ -3758,6 +3764,7 @@
             <a:prstGeom prst="moon">
               <a:avLst/>
             </a:prstGeom>
+            <a:grpFill/>
             <a:ln>
               <a:noFill/>
             </a:ln>
@@ -3807,6 +3814,7 @@
             <a:prstGeom prst="triangle">
               <a:avLst/>
             </a:prstGeom>
+            <a:grpFill/>
             <a:ln>
               <a:noFill/>
             </a:ln>
@@ -3860,15 +3868,15 @@
         </p:spPr>
         <p:style>
           <a:lnRef idx="2">
-            <a:schemeClr val="accent2">
+            <a:schemeClr val="accent5">
               <a:shade val="50000"/>
             </a:schemeClr>
           </a:lnRef>
           <a:fillRef idx="1">
-            <a:schemeClr val="accent2"/>
+            <a:schemeClr val="accent5"/>
           </a:fillRef>
           <a:effectRef idx="0">
-            <a:schemeClr val="accent2"/>
+            <a:schemeClr val="accent5"/>
           </a:effectRef>
           <a:fontRef idx="minor">
             <a:schemeClr val="lt1"/>
@@ -3910,15 +3918,15 @@
         </p:spPr>
         <p:style>
           <a:lnRef idx="2">
-            <a:schemeClr val="accent2">
+            <a:schemeClr val="accent5">
               <a:shade val="50000"/>
             </a:schemeClr>
           </a:lnRef>
           <a:fillRef idx="1">
-            <a:schemeClr val="accent2"/>
+            <a:schemeClr val="accent5"/>
           </a:fillRef>
           <a:effectRef idx="0">
-            <a:schemeClr val="accent2"/>
+            <a:schemeClr val="accent5"/>
           </a:effectRef>
           <a:fontRef idx="minor">
             <a:schemeClr val="lt1"/>

</xml_diff>